<commit_message>
retrospect for sprint 3 done
</commit_message>
<xml_diff>
--- a/Retrospective/Sprint 3 - Retrospective.pptx
+++ b/Retrospective/Sprint 3 - Retrospective.pptx
@@ -186,7 +186,7 @@
           <a:noFill/>
           <a:extLst>
             <a:ext uri="{909E8E84-426E-40dd-AFC4-6F175D3DCCD1}">
-              <a14:hiddenFill xmlns:a14="http://schemas.microsoft.com/office/drawing/2010/main" xmlns="">
+              <a14:hiddenFill xmlns="" xmlns:a14="http://schemas.microsoft.com/office/drawing/2010/main">
                 <a:solidFill>
                   <a:srgbClr val="FFFFFF"/>
                 </a:solidFill>
@@ -245,7 +245,7 @@
             </a:ln>
             <a:extLst>
               <a:ext uri="{91240B29-F687-4f45-9708-019B960494DF}">
-                <a14:hiddenLine xmlns:a14="http://schemas.microsoft.com/office/drawing/2010/main" xmlns="" w="9525">
+                <a14:hiddenLine xmlns="" xmlns:a14="http://schemas.microsoft.com/office/drawing/2010/main" w="9525">
                   <a:solidFill>
                     <a:srgbClr val="000000"/>
                   </a:solidFill>
@@ -335,7 +335,7 @@
             </a:ln>
             <a:extLst>
               <a:ext uri="{91240B29-F687-4f45-9708-019B960494DF}">
-                <a14:hiddenLine xmlns:a14="http://schemas.microsoft.com/office/drawing/2010/main" xmlns="" w="9525">
+                <a14:hiddenLine xmlns="" xmlns:a14="http://schemas.microsoft.com/office/drawing/2010/main" w="9525">
                   <a:solidFill>
                     <a:srgbClr val="000000"/>
                   </a:solidFill>
@@ -425,7 +425,7 @@
             </a:ln>
             <a:extLst>
               <a:ext uri="{91240B29-F687-4f45-9708-019B960494DF}">
-                <a14:hiddenLine xmlns:a14="http://schemas.microsoft.com/office/drawing/2010/main" xmlns="" w="9525">
+                <a14:hiddenLine xmlns="" xmlns:a14="http://schemas.microsoft.com/office/drawing/2010/main" w="9525">
                   <a:solidFill>
                     <a:srgbClr val="000000"/>
                   </a:solidFill>
@@ -459,7 +459,7 @@
             </a:ln>
             <a:extLst>
               <a:ext uri="{91240B29-F687-4f45-9708-019B960494DF}">
-                <a14:hiddenLine xmlns:a14="http://schemas.microsoft.com/office/drawing/2010/main" xmlns="" w="9525">
+                <a14:hiddenLine xmlns="" xmlns:a14="http://schemas.microsoft.com/office/drawing/2010/main" w="9525">
                   <a:solidFill>
                     <a:srgbClr val="000000"/>
                   </a:solidFill>
@@ -549,7 +549,7 @@
             </a:ln>
             <a:extLst>
               <a:ext uri="{91240B29-F687-4f45-9708-019B960494DF}">
-                <a14:hiddenLine xmlns:a14="http://schemas.microsoft.com/office/drawing/2010/main" xmlns="" w="9525">
+                <a14:hiddenLine xmlns="" xmlns:a14="http://schemas.microsoft.com/office/drawing/2010/main" w="9525">
                   <a:solidFill>
                     <a:srgbClr val="000000"/>
                   </a:solidFill>
@@ -611,7 +611,7 @@
             </a:ln>
             <a:extLst>
               <a:ext uri="{91240B29-F687-4f45-9708-019B960494DF}">
-                <a14:hiddenLine xmlns:a14="http://schemas.microsoft.com/office/drawing/2010/main" xmlns="" w="9525">
+                <a14:hiddenLine xmlns="" xmlns:a14="http://schemas.microsoft.com/office/drawing/2010/main" w="9525">
                   <a:solidFill>
                     <a:srgbClr val="000000"/>
                   </a:solidFill>
@@ -673,7 +673,7 @@
             </a:ln>
             <a:extLst>
               <a:ext uri="{91240B29-F687-4f45-9708-019B960494DF}">
-                <a14:hiddenLine xmlns:a14="http://schemas.microsoft.com/office/drawing/2010/main" xmlns="" w="9525">
+                <a14:hiddenLine xmlns="" xmlns:a14="http://schemas.microsoft.com/office/drawing/2010/main" w="9525">
                   <a:solidFill>
                     <a:srgbClr val="000000"/>
                   </a:solidFill>
@@ -763,7 +763,7 @@
             </a:ln>
             <a:extLst>
               <a:ext uri="{91240B29-F687-4f45-9708-019B960494DF}">
-                <a14:hiddenLine xmlns:a14="http://schemas.microsoft.com/office/drawing/2010/main" xmlns="" w="9525">
+                <a14:hiddenLine xmlns="" xmlns:a14="http://schemas.microsoft.com/office/drawing/2010/main" w="9525">
                   <a:solidFill>
                     <a:srgbClr val="000000"/>
                   </a:solidFill>
@@ -825,7 +825,7 @@
             </a:ln>
             <a:extLst>
               <a:ext uri="{91240B29-F687-4f45-9708-019B960494DF}">
-                <a14:hiddenLine xmlns:a14="http://schemas.microsoft.com/office/drawing/2010/main" xmlns="" w="9525">
+                <a14:hiddenLine xmlns="" xmlns:a14="http://schemas.microsoft.com/office/drawing/2010/main" w="9525">
                   <a:solidFill>
                     <a:srgbClr val="000000"/>
                   </a:solidFill>
@@ -887,7 +887,7 @@
             </a:ln>
             <a:extLst>
               <a:ext uri="{91240B29-F687-4f45-9708-019B960494DF}">
-                <a14:hiddenLine xmlns:a14="http://schemas.microsoft.com/office/drawing/2010/main" xmlns="" w="9525">
+                <a14:hiddenLine xmlns="" xmlns:a14="http://schemas.microsoft.com/office/drawing/2010/main" w="9525">
                   <a:solidFill>
                     <a:srgbClr val="000000"/>
                   </a:solidFill>
@@ -977,7 +977,7 @@
             </a:ln>
             <a:extLst>
               <a:ext uri="{91240B29-F687-4f45-9708-019B960494DF}">
-                <a14:hiddenLine xmlns:a14="http://schemas.microsoft.com/office/drawing/2010/main" xmlns="" w="9525">
+                <a14:hiddenLine xmlns="" xmlns:a14="http://schemas.microsoft.com/office/drawing/2010/main" w="9525">
                   <a:solidFill>
                     <a:srgbClr val="000000"/>
                   </a:solidFill>
@@ -1067,7 +1067,7 @@
             </a:ln>
             <a:extLst>
               <a:ext uri="{91240B29-F687-4f45-9708-019B960494DF}">
-                <a14:hiddenLine xmlns:a14="http://schemas.microsoft.com/office/drawing/2010/main" xmlns="" w="9525">
+                <a14:hiddenLine xmlns="" xmlns:a14="http://schemas.microsoft.com/office/drawing/2010/main" w="9525">
                   <a:solidFill>
                     <a:srgbClr val="000000"/>
                   </a:solidFill>
@@ -1129,7 +1129,7 @@
             </a:ln>
             <a:extLst>
               <a:ext uri="{91240B29-F687-4f45-9708-019B960494DF}">
-                <a14:hiddenLine xmlns:a14="http://schemas.microsoft.com/office/drawing/2010/main" xmlns="" w="9525">
+                <a14:hiddenLine xmlns="" xmlns:a14="http://schemas.microsoft.com/office/drawing/2010/main" w="9525">
                   <a:solidFill>
                     <a:srgbClr val="000000"/>
                   </a:solidFill>
@@ -1239,7 +1239,7 @@
             </a:ln>
             <a:extLst>
               <a:ext uri="{91240B29-F687-4f45-9708-019B960494DF}">
-                <a14:hiddenLine xmlns:a14="http://schemas.microsoft.com/office/drawing/2010/main" xmlns="" w="9525">
+                <a14:hiddenLine xmlns="" xmlns:a14="http://schemas.microsoft.com/office/drawing/2010/main" w="9525">
                   <a:solidFill>
                     <a:srgbClr val="000000"/>
                   </a:solidFill>
@@ -1301,7 +1301,7 @@
             </a:ln>
             <a:extLst>
               <a:ext uri="{91240B29-F687-4f45-9708-019B960494DF}">
-                <a14:hiddenLine xmlns:a14="http://schemas.microsoft.com/office/drawing/2010/main" xmlns="" w="9525">
+                <a14:hiddenLine xmlns="" xmlns:a14="http://schemas.microsoft.com/office/drawing/2010/main" w="9525">
                   <a:solidFill>
                     <a:srgbClr val="000000"/>
                   </a:solidFill>
@@ -1391,7 +1391,7 @@
             </a:ln>
             <a:extLst>
               <a:ext uri="{91240B29-F687-4f45-9708-019B960494DF}">
-                <a14:hiddenLine xmlns:a14="http://schemas.microsoft.com/office/drawing/2010/main" xmlns="" w="9525">
+                <a14:hiddenLine xmlns="" xmlns:a14="http://schemas.microsoft.com/office/drawing/2010/main" w="9525">
                   <a:solidFill>
                     <a:srgbClr val="000000"/>
                   </a:solidFill>
@@ -1481,7 +1481,7 @@
             </a:ln>
             <a:extLst>
               <a:ext uri="{91240B29-F687-4f45-9708-019B960494DF}">
-                <a14:hiddenLine xmlns:a14="http://schemas.microsoft.com/office/drawing/2010/main" xmlns="" w="9525">
+                <a14:hiddenLine xmlns="" xmlns:a14="http://schemas.microsoft.com/office/drawing/2010/main" w="9525">
                   <a:solidFill>
                     <a:srgbClr val="000000"/>
                   </a:solidFill>
@@ -1543,7 +1543,7 @@
             </a:ln>
             <a:extLst>
               <a:ext uri="{91240B29-F687-4f45-9708-019B960494DF}">
-                <a14:hiddenLine xmlns:a14="http://schemas.microsoft.com/office/drawing/2010/main" xmlns="" w="9525">
+                <a14:hiddenLine xmlns="" xmlns:a14="http://schemas.microsoft.com/office/drawing/2010/main" w="9525">
                   <a:solidFill>
                     <a:srgbClr val="000000"/>
                   </a:solidFill>
@@ -1633,7 +1633,7 @@
             </a:ln>
             <a:extLst>
               <a:ext uri="{91240B29-F687-4f45-9708-019B960494DF}">
-                <a14:hiddenLine xmlns:a14="http://schemas.microsoft.com/office/drawing/2010/main" xmlns="" w="9525">
+                <a14:hiddenLine xmlns="" xmlns:a14="http://schemas.microsoft.com/office/drawing/2010/main" w="9525">
                   <a:solidFill>
                     <a:srgbClr val="000000"/>
                   </a:solidFill>
@@ -1723,7 +1723,7 @@
             </a:ln>
             <a:extLst>
               <a:ext uri="{91240B29-F687-4f45-9708-019B960494DF}">
-                <a14:hiddenLine xmlns:a14="http://schemas.microsoft.com/office/drawing/2010/main" xmlns="" w="9525">
+                <a14:hiddenLine xmlns="" xmlns:a14="http://schemas.microsoft.com/office/drawing/2010/main" w="9525">
                   <a:solidFill>
                     <a:srgbClr val="000000"/>
                   </a:solidFill>
@@ -1779,7 +1779,7 @@
             </a:ln>
             <a:extLst>
               <a:ext uri="{91240B29-F687-4f45-9708-019B960494DF}">
-                <a14:hiddenLine xmlns:a14="http://schemas.microsoft.com/office/drawing/2010/main" xmlns="" w="9525">
+                <a14:hiddenLine xmlns="" xmlns:a14="http://schemas.microsoft.com/office/drawing/2010/main" w="9525">
                   <a:solidFill>
                     <a:srgbClr val="000000"/>
                   </a:solidFill>
@@ -1869,7 +1869,7 @@
             </a:ln>
             <a:extLst>
               <a:ext uri="{91240B29-F687-4f45-9708-019B960494DF}">
-                <a14:hiddenLine xmlns:a14="http://schemas.microsoft.com/office/drawing/2010/main" xmlns="" w="9525">
+                <a14:hiddenLine xmlns="" xmlns:a14="http://schemas.microsoft.com/office/drawing/2010/main" w="9525">
                   <a:solidFill>
                     <a:srgbClr val="000000"/>
                   </a:solidFill>
@@ -1925,7 +1925,7 @@
             </a:ln>
             <a:extLst>
               <a:ext uri="{91240B29-F687-4f45-9708-019B960494DF}">
-                <a14:hiddenLine xmlns:a14="http://schemas.microsoft.com/office/drawing/2010/main" xmlns="" w="9525">
+                <a14:hiddenLine xmlns="" xmlns:a14="http://schemas.microsoft.com/office/drawing/2010/main" w="9525">
                   <a:solidFill>
                     <a:srgbClr val="000000"/>
                   </a:solidFill>
@@ -2015,7 +2015,7 @@
             </a:ln>
             <a:extLst>
               <a:ext uri="{91240B29-F687-4f45-9708-019B960494DF}">
-                <a14:hiddenLine xmlns:a14="http://schemas.microsoft.com/office/drawing/2010/main" xmlns="" w="9525">
+                <a14:hiddenLine xmlns="" xmlns:a14="http://schemas.microsoft.com/office/drawing/2010/main" w="9525">
                   <a:solidFill>
                     <a:srgbClr val="000000"/>
                   </a:solidFill>
@@ -2083,7 +2083,7 @@
             </a:ln>
             <a:extLst>
               <a:ext uri="{91240B29-F687-4f45-9708-019B960494DF}">
-                <a14:hiddenLine xmlns:a14="http://schemas.microsoft.com/office/drawing/2010/main" xmlns="" w="9525">
+                <a14:hiddenLine xmlns="" xmlns:a14="http://schemas.microsoft.com/office/drawing/2010/main" w="9525">
                   <a:solidFill>
                     <a:srgbClr val="000000"/>
                   </a:solidFill>
@@ -2173,7 +2173,7 @@
             </a:ln>
             <a:extLst>
               <a:ext uri="{91240B29-F687-4f45-9708-019B960494DF}">
-                <a14:hiddenLine xmlns:a14="http://schemas.microsoft.com/office/drawing/2010/main" xmlns="" w="9525">
+                <a14:hiddenLine xmlns="" xmlns:a14="http://schemas.microsoft.com/office/drawing/2010/main" w="9525">
                   <a:solidFill>
                     <a:srgbClr val="000000"/>
                   </a:solidFill>
@@ -2241,7 +2241,7 @@
             </a:ln>
             <a:extLst>
               <a:ext uri="{91240B29-F687-4f45-9708-019B960494DF}">
-                <a14:hiddenLine xmlns:a14="http://schemas.microsoft.com/office/drawing/2010/main" xmlns="" w="9525">
+                <a14:hiddenLine xmlns="" xmlns:a14="http://schemas.microsoft.com/office/drawing/2010/main" w="9525">
                   <a:solidFill>
                     <a:srgbClr val="000000"/>
                   </a:solidFill>
@@ -2331,7 +2331,7 @@
             </a:ln>
             <a:extLst>
               <a:ext uri="{91240B29-F687-4f45-9708-019B960494DF}">
-                <a14:hiddenLine xmlns:a14="http://schemas.microsoft.com/office/drawing/2010/main" xmlns="" w="9525">
+                <a14:hiddenLine xmlns="" xmlns:a14="http://schemas.microsoft.com/office/drawing/2010/main" w="9525">
                   <a:solidFill>
                     <a:srgbClr val="000000"/>
                   </a:solidFill>
@@ -2365,7 +2365,7 @@
             </a:ln>
             <a:extLst>
               <a:ext uri="{91240B29-F687-4f45-9708-019B960494DF}">
-                <a14:hiddenLine xmlns:a14="http://schemas.microsoft.com/office/drawing/2010/main" xmlns="" w="9525">
+                <a14:hiddenLine xmlns="" xmlns:a14="http://schemas.microsoft.com/office/drawing/2010/main" w="9525">
                   <a:solidFill>
                     <a:srgbClr val="000000"/>
                   </a:solidFill>
@@ -2455,7 +2455,7 @@
             </a:ln>
             <a:extLst>
               <a:ext uri="{91240B29-F687-4f45-9708-019B960494DF}">
-                <a14:hiddenLine xmlns:a14="http://schemas.microsoft.com/office/drawing/2010/main" xmlns="" w="9525">
+                <a14:hiddenLine xmlns="" xmlns:a14="http://schemas.microsoft.com/office/drawing/2010/main" w="9525">
                   <a:solidFill>
                     <a:srgbClr val="000000"/>
                   </a:solidFill>
@@ -2517,7 +2517,7 @@
             </a:ln>
             <a:extLst>
               <a:ext uri="{91240B29-F687-4f45-9708-019B960494DF}">
-                <a14:hiddenLine xmlns:a14="http://schemas.microsoft.com/office/drawing/2010/main" xmlns="" w="9525">
+                <a14:hiddenLine xmlns="" xmlns:a14="http://schemas.microsoft.com/office/drawing/2010/main" w="9525">
                   <a:solidFill>
                     <a:srgbClr val="000000"/>
                   </a:solidFill>
@@ -2579,7 +2579,7 @@
             </a:ln>
             <a:extLst>
               <a:ext uri="{91240B29-F687-4f45-9708-019B960494DF}">
-                <a14:hiddenLine xmlns:a14="http://schemas.microsoft.com/office/drawing/2010/main" xmlns="" w="9525">
+                <a14:hiddenLine xmlns="" xmlns:a14="http://schemas.microsoft.com/office/drawing/2010/main" w="9525">
                   <a:solidFill>
                     <a:srgbClr val="000000"/>
                   </a:solidFill>
@@ -2669,7 +2669,7 @@
             </a:ln>
             <a:extLst>
               <a:ext uri="{91240B29-F687-4f45-9708-019B960494DF}">
-                <a14:hiddenLine xmlns:a14="http://schemas.microsoft.com/office/drawing/2010/main" xmlns="" w="9525">
+                <a14:hiddenLine xmlns="" xmlns:a14="http://schemas.microsoft.com/office/drawing/2010/main" w="9525">
                   <a:solidFill>
                     <a:srgbClr val="000000"/>
                   </a:solidFill>
@@ -2737,7 +2737,7 @@
             </a:ln>
             <a:extLst>
               <a:ext uri="{91240B29-F687-4f45-9708-019B960494DF}">
-                <a14:hiddenLine xmlns:a14="http://schemas.microsoft.com/office/drawing/2010/main" xmlns="" w="9525">
+                <a14:hiddenLine xmlns="" xmlns:a14="http://schemas.microsoft.com/office/drawing/2010/main" w="9525">
                   <a:solidFill>
                     <a:srgbClr val="000000"/>
                   </a:solidFill>
@@ -2799,7 +2799,7 @@
             </a:ln>
             <a:extLst>
               <a:ext uri="{91240B29-F687-4f45-9708-019B960494DF}">
-                <a14:hiddenLine xmlns:a14="http://schemas.microsoft.com/office/drawing/2010/main" xmlns="" w="9525">
+                <a14:hiddenLine xmlns="" xmlns:a14="http://schemas.microsoft.com/office/drawing/2010/main" w="9525">
                   <a:solidFill>
                     <a:srgbClr val="000000"/>
                   </a:solidFill>
@@ -2889,7 +2889,7 @@
             </a:ln>
             <a:extLst>
               <a:ext uri="{91240B29-F687-4f45-9708-019B960494DF}">
-                <a14:hiddenLine xmlns:a14="http://schemas.microsoft.com/office/drawing/2010/main" xmlns="" w="9525">
+                <a14:hiddenLine xmlns="" xmlns:a14="http://schemas.microsoft.com/office/drawing/2010/main" w="9525">
                   <a:solidFill>
                     <a:srgbClr val="000000"/>
                   </a:solidFill>
@@ -2951,7 +2951,7 @@
             </a:ln>
             <a:extLst>
               <a:ext uri="{91240B29-F687-4f45-9708-019B960494DF}">
-                <a14:hiddenLine xmlns:a14="http://schemas.microsoft.com/office/drawing/2010/main" xmlns="" w="9525">
+                <a14:hiddenLine xmlns="" xmlns:a14="http://schemas.microsoft.com/office/drawing/2010/main" w="9525">
                   <a:solidFill>
                     <a:srgbClr val="000000"/>
                   </a:solidFill>
@@ -3041,7 +3041,7 @@
             </a:ln>
             <a:extLst>
               <a:ext uri="{91240B29-F687-4f45-9708-019B960494DF}">
-                <a14:hiddenLine xmlns:a14="http://schemas.microsoft.com/office/drawing/2010/main" xmlns="" w="9525">
+                <a14:hiddenLine xmlns="" xmlns:a14="http://schemas.microsoft.com/office/drawing/2010/main" w="9525">
                   <a:solidFill>
                     <a:srgbClr val="000000"/>
                   </a:solidFill>
@@ -3103,7 +3103,7 @@
             </a:ln>
             <a:extLst>
               <a:ext uri="{91240B29-F687-4f45-9708-019B960494DF}">
-                <a14:hiddenLine xmlns:a14="http://schemas.microsoft.com/office/drawing/2010/main" xmlns="" w="9525">
+                <a14:hiddenLine xmlns="" xmlns:a14="http://schemas.microsoft.com/office/drawing/2010/main" w="9525">
                   <a:solidFill>
                     <a:srgbClr val="000000"/>
                   </a:solidFill>
@@ -3193,7 +3193,7 @@
             </a:ln>
             <a:extLst>
               <a:ext uri="{91240B29-F687-4f45-9708-019B960494DF}">
-                <a14:hiddenLine xmlns:a14="http://schemas.microsoft.com/office/drawing/2010/main" xmlns="" w="9525">
+                <a14:hiddenLine xmlns="" xmlns:a14="http://schemas.microsoft.com/office/drawing/2010/main" w="9525">
                   <a:solidFill>
                     <a:srgbClr val="000000"/>
                   </a:solidFill>
@@ -3227,7 +3227,7 @@
             </a:ln>
             <a:extLst>
               <a:ext uri="{91240B29-F687-4f45-9708-019B960494DF}">
-                <a14:hiddenLine xmlns:a14="http://schemas.microsoft.com/office/drawing/2010/main" xmlns="" w="9525">
+                <a14:hiddenLine xmlns="" xmlns:a14="http://schemas.microsoft.com/office/drawing/2010/main" w="9525">
                   <a:solidFill>
                     <a:srgbClr val="000000"/>
                   </a:solidFill>
@@ -3292,7 +3292,7 @@
             </a:ln>
             <a:extLst>
               <a:ext uri="{91240B29-F687-4f45-9708-019B960494DF}">
-                <a14:hiddenLine xmlns:a14="http://schemas.microsoft.com/office/drawing/2010/main" xmlns="" w="9525">
+                <a14:hiddenLine xmlns="" xmlns:a14="http://schemas.microsoft.com/office/drawing/2010/main" w="9525">
                   <a:solidFill>
                     <a:srgbClr val="000000"/>
                   </a:solidFill>
@@ -3382,7 +3382,7 @@
             </a:ln>
             <a:extLst>
               <a:ext uri="{91240B29-F687-4f45-9708-019B960494DF}">
-                <a14:hiddenLine xmlns:a14="http://schemas.microsoft.com/office/drawing/2010/main" xmlns="" w="9525">
+                <a14:hiddenLine xmlns="" xmlns:a14="http://schemas.microsoft.com/office/drawing/2010/main" w="9525">
                   <a:solidFill>
                     <a:srgbClr val="000000"/>
                   </a:solidFill>
@@ -3444,7 +3444,7 @@
             </a:ln>
             <a:extLst>
               <a:ext uri="{91240B29-F687-4f45-9708-019B960494DF}">
-                <a14:hiddenLine xmlns:a14="http://schemas.microsoft.com/office/drawing/2010/main" xmlns="" w="9525">
+                <a14:hiddenLine xmlns="" xmlns:a14="http://schemas.microsoft.com/office/drawing/2010/main" w="9525">
                   <a:solidFill>
                     <a:srgbClr val="000000"/>
                   </a:solidFill>
@@ -3534,7 +3534,7 @@
             </a:ln>
             <a:extLst>
               <a:ext uri="{91240B29-F687-4f45-9708-019B960494DF}">
-                <a14:hiddenLine xmlns:a14="http://schemas.microsoft.com/office/drawing/2010/main" xmlns="" w="9525">
+                <a14:hiddenLine xmlns="" xmlns:a14="http://schemas.microsoft.com/office/drawing/2010/main" w="9525">
                   <a:solidFill>
                     <a:srgbClr val="000000"/>
                   </a:solidFill>
@@ -3624,7 +3624,7 @@
             </a:ln>
             <a:extLst>
               <a:ext uri="{91240B29-F687-4f45-9708-019B960494DF}">
-                <a14:hiddenLine xmlns:a14="http://schemas.microsoft.com/office/drawing/2010/main" xmlns="" w="9525">
+                <a14:hiddenLine xmlns="" xmlns:a14="http://schemas.microsoft.com/office/drawing/2010/main" w="9525">
                   <a:solidFill>
                     <a:srgbClr val="000000"/>
                   </a:solidFill>
@@ -3689,7 +3689,7 @@
             </a:ln>
             <a:extLst>
               <a:ext uri="{91240B29-F687-4f45-9708-019B960494DF}">
-                <a14:hiddenLine xmlns:a14="http://schemas.microsoft.com/office/drawing/2010/main" xmlns="" w="9525">
+                <a14:hiddenLine xmlns="" xmlns:a14="http://schemas.microsoft.com/office/drawing/2010/main" w="9525">
                   <a:solidFill>
                     <a:srgbClr val="000000"/>
                   </a:solidFill>
@@ -3751,7 +3751,7 @@
             </a:ln>
             <a:extLst>
               <a:ext uri="{91240B29-F687-4f45-9708-019B960494DF}">
-                <a14:hiddenLine xmlns:a14="http://schemas.microsoft.com/office/drawing/2010/main" xmlns="" w="9525">
+                <a14:hiddenLine xmlns="" xmlns:a14="http://schemas.microsoft.com/office/drawing/2010/main" w="9525">
                   <a:solidFill>
                     <a:srgbClr val="000000"/>
                   </a:solidFill>
@@ -3841,7 +3841,7 @@
             </a:ln>
             <a:extLst>
               <a:ext uri="{91240B29-F687-4f45-9708-019B960494DF}">
-                <a14:hiddenLine xmlns:a14="http://schemas.microsoft.com/office/drawing/2010/main" xmlns="" w="9525">
+                <a14:hiddenLine xmlns="" xmlns:a14="http://schemas.microsoft.com/office/drawing/2010/main" w="9525">
                   <a:solidFill>
                     <a:srgbClr val="000000"/>
                   </a:solidFill>
@@ -3931,7 +3931,7 @@
             </a:ln>
             <a:extLst>
               <a:ext uri="{91240B29-F687-4f45-9708-019B960494DF}">
-                <a14:hiddenLine xmlns:a14="http://schemas.microsoft.com/office/drawing/2010/main" xmlns="" w="9525">
+                <a14:hiddenLine xmlns="" xmlns:a14="http://schemas.microsoft.com/office/drawing/2010/main" w="9525">
                   <a:solidFill>
                     <a:srgbClr val="000000"/>
                   </a:solidFill>
@@ -3993,7 +3993,7 @@
             </a:ln>
             <a:extLst>
               <a:ext uri="{91240B29-F687-4f45-9708-019B960494DF}">
-                <a14:hiddenLine xmlns:a14="http://schemas.microsoft.com/office/drawing/2010/main" xmlns="" w="9525">
+                <a14:hiddenLine xmlns="" xmlns:a14="http://schemas.microsoft.com/office/drawing/2010/main" w="9525">
                   <a:solidFill>
                     <a:srgbClr val="000000"/>
                   </a:solidFill>
@@ -4113,7 +4113,7 @@
             </a:ln>
             <a:extLst>
               <a:ext uri="{91240B29-F687-4f45-9708-019B960494DF}">
-                <a14:hiddenLine xmlns:a14="http://schemas.microsoft.com/office/drawing/2010/main" xmlns="" w="9525">
+                <a14:hiddenLine xmlns="" xmlns:a14="http://schemas.microsoft.com/office/drawing/2010/main" w="9525">
                   <a:solidFill>
                     <a:srgbClr val="000000"/>
                   </a:solidFill>
@@ -4181,7 +4181,7 @@
             </a:ln>
             <a:extLst>
               <a:ext uri="{91240B29-F687-4f45-9708-019B960494DF}">
-                <a14:hiddenLine xmlns:a14="http://schemas.microsoft.com/office/drawing/2010/main" xmlns="" w="9525">
+                <a14:hiddenLine xmlns="" xmlns:a14="http://schemas.microsoft.com/office/drawing/2010/main" w="9525">
                   <a:solidFill>
                     <a:srgbClr val="000000"/>
                   </a:solidFill>
@@ -4271,7 +4271,7 @@
             </a:ln>
             <a:extLst>
               <a:ext uri="{91240B29-F687-4f45-9708-019B960494DF}">
-                <a14:hiddenLine xmlns:a14="http://schemas.microsoft.com/office/drawing/2010/main" xmlns="" w="9525">
+                <a14:hiddenLine xmlns="" xmlns:a14="http://schemas.microsoft.com/office/drawing/2010/main" w="9525">
                   <a:solidFill>
                     <a:srgbClr val="000000"/>
                   </a:solidFill>
@@ -9000,7 +9000,7 @@
           <a:noFill/>
           <a:extLst>
             <a:ext uri="{909E8E84-426E-40dd-AFC4-6F175D3DCCD1}">
-              <a14:hiddenFill xmlns:a14="http://schemas.microsoft.com/office/drawing/2010/main" xmlns="">
+              <a14:hiddenFill xmlns="" xmlns:a14="http://schemas.microsoft.com/office/drawing/2010/main">
                 <a:solidFill>
                   <a:srgbClr val="FFFFFF"/>
                 </a:solidFill>
@@ -9074,7 +9074,7 @@
               </a:ln>
               <a:extLst>
                 <a:ext uri="{91240B29-F687-4f45-9708-019B960494DF}">
-                  <a14:hiddenLine xmlns:a14="http://schemas.microsoft.com/office/drawing/2010/main" xmlns="" w="9525">
+                  <a14:hiddenLine xmlns="" xmlns:a14="http://schemas.microsoft.com/office/drawing/2010/main" w="9525">
                     <a:solidFill>
                       <a:srgbClr val="000000"/>
                     </a:solidFill>
@@ -9164,7 +9164,7 @@
               </a:ln>
               <a:extLst>
                 <a:ext uri="{91240B29-F687-4f45-9708-019B960494DF}">
-                  <a14:hiddenLine xmlns:a14="http://schemas.microsoft.com/office/drawing/2010/main" xmlns="" w="9525">
+                  <a14:hiddenLine xmlns="" xmlns:a14="http://schemas.microsoft.com/office/drawing/2010/main" w="9525">
                     <a:solidFill>
                       <a:srgbClr val="000000"/>
                     </a:solidFill>
@@ -9254,7 +9254,7 @@
               </a:ln>
               <a:extLst>
                 <a:ext uri="{91240B29-F687-4f45-9708-019B960494DF}">
-                  <a14:hiddenLine xmlns:a14="http://schemas.microsoft.com/office/drawing/2010/main" xmlns="" w="9525">
+                  <a14:hiddenLine xmlns="" xmlns:a14="http://schemas.microsoft.com/office/drawing/2010/main" w="9525">
                     <a:solidFill>
                       <a:srgbClr val="000000"/>
                     </a:solidFill>
@@ -9316,7 +9316,7 @@
               </a:ln>
               <a:extLst>
                 <a:ext uri="{91240B29-F687-4f45-9708-019B960494DF}">
-                  <a14:hiddenLine xmlns:a14="http://schemas.microsoft.com/office/drawing/2010/main" xmlns="" w="9525">
+                  <a14:hiddenLine xmlns="" xmlns:a14="http://schemas.microsoft.com/office/drawing/2010/main" w="9525">
                     <a:solidFill>
                       <a:srgbClr val="000000"/>
                     </a:solidFill>
@@ -9406,7 +9406,7 @@
               </a:ln>
               <a:extLst>
                 <a:ext uri="{91240B29-F687-4f45-9708-019B960494DF}">
-                  <a14:hiddenLine xmlns:a14="http://schemas.microsoft.com/office/drawing/2010/main" xmlns="" w="9525">
+                  <a14:hiddenLine xmlns="" xmlns:a14="http://schemas.microsoft.com/office/drawing/2010/main" w="9525">
                     <a:solidFill>
                       <a:srgbClr val="000000"/>
                     </a:solidFill>
@@ -9468,7 +9468,7 @@
               </a:ln>
               <a:extLst>
                 <a:ext uri="{91240B29-F687-4f45-9708-019B960494DF}">
-                  <a14:hiddenLine xmlns:a14="http://schemas.microsoft.com/office/drawing/2010/main" xmlns="" w="9525">
+                  <a14:hiddenLine xmlns="" xmlns:a14="http://schemas.microsoft.com/office/drawing/2010/main" w="9525">
                     <a:solidFill>
                       <a:srgbClr val="000000"/>
                     </a:solidFill>
@@ -9530,7 +9530,7 @@
               </a:ln>
               <a:extLst>
                 <a:ext uri="{91240B29-F687-4f45-9708-019B960494DF}">
-                  <a14:hiddenLine xmlns:a14="http://schemas.microsoft.com/office/drawing/2010/main" xmlns="" w="9525">
+                  <a14:hiddenLine xmlns="" xmlns:a14="http://schemas.microsoft.com/office/drawing/2010/main" w="9525">
                     <a:solidFill>
                       <a:srgbClr val="000000"/>
                     </a:solidFill>
@@ -9620,7 +9620,7 @@
               </a:ln>
               <a:extLst>
                 <a:ext uri="{91240B29-F687-4f45-9708-019B960494DF}">
-                  <a14:hiddenLine xmlns:a14="http://schemas.microsoft.com/office/drawing/2010/main" xmlns="" w="9525">
+                  <a14:hiddenLine xmlns="" xmlns:a14="http://schemas.microsoft.com/office/drawing/2010/main" w="9525">
                     <a:solidFill>
                       <a:srgbClr val="000000"/>
                     </a:solidFill>
@@ -9710,7 +9710,7 @@
               </a:ln>
               <a:extLst>
                 <a:ext uri="{91240B29-F687-4f45-9708-019B960494DF}">
-                  <a14:hiddenLine xmlns:a14="http://schemas.microsoft.com/office/drawing/2010/main" xmlns="" w="9525">
+                  <a14:hiddenLine xmlns="" xmlns:a14="http://schemas.microsoft.com/office/drawing/2010/main" w="9525">
                     <a:solidFill>
                       <a:srgbClr val="000000"/>
                     </a:solidFill>
@@ -9772,7 +9772,7 @@
               </a:ln>
               <a:extLst>
                 <a:ext uri="{91240B29-F687-4f45-9708-019B960494DF}">
-                  <a14:hiddenLine xmlns:a14="http://schemas.microsoft.com/office/drawing/2010/main" xmlns="" w="9525">
+                  <a14:hiddenLine xmlns="" xmlns:a14="http://schemas.microsoft.com/office/drawing/2010/main" w="9525">
                     <a:solidFill>
                       <a:srgbClr val="000000"/>
                     </a:solidFill>
@@ -9882,7 +9882,7 @@
               </a:ln>
               <a:extLst>
                 <a:ext uri="{91240B29-F687-4f45-9708-019B960494DF}">
-                  <a14:hiddenLine xmlns:a14="http://schemas.microsoft.com/office/drawing/2010/main" xmlns="" w="9525">
+                  <a14:hiddenLine xmlns="" xmlns:a14="http://schemas.microsoft.com/office/drawing/2010/main" w="9525">
                     <a:solidFill>
                       <a:srgbClr val="000000"/>
                     </a:solidFill>
@@ -9966,7 +9966,7 @@
               </a:ln>
               <a:extLst>
                 <a:ext uri="{91240B29-F687-4f45-9708-019B960494DF}">
-                  <a14:hiddenLine xmlns:a14="http://schemas.microsoft.com/office/drawing/2010/main" xmlns="" w="9525">
+                  <a14:hiddenLine xmlns="" xmlns:a14="http://schemas.microsoft.com/office/drawing/2010/main" w="9525">
                     <a:solidFill>
                       <a:srgbClr val="000000"/>
                     </a:solidFill>
@@ -10028,7 +10028,7 @@
               </a:ln>
               <a:extLst>
                 <a:ext uri="{91240B29-F687-4f45-9708-019B960494DF}">
-                  <a14:hiddenLine xmlns:a14="http://schemas.microsoft.com/office/drawing/2010/main" xmlns="" w="9525">
+                  <a14:hiddenLine xmlns="" xmlns:a14="http://schemas.microsoft.com/office/drawing/2010/main" w="9525">
                     <a:solidFill>
                       <a:srgbClr val="000000"/>
                     </a:solidFill>
@@ -10090,7 +10090,7 @@
               </a:ln>
               <a:extLst>
                 <a:ext uri="{91240B29-F687-4f45-9708-019B960494DF}">
-                  <a14:hiddenLine xmlns:a14="http://schemas.microsoft.com/office/drawing/2010/main" xmlns="" w="9525">
+                  <a14:hiddenLine xmlns="" xmlns:a14="http://schemas.microsoft.com/office/drawing/2010/main" w="9525">
                     <a:solidFill>
                       <a:srgbClr val="000000"/>
                     </a:solidFill>
@@ -10180,7 +10180,7 @@
               </a:ln>
               <a:extLst>
                 <a:ext uri="{91240B29-F687-4f45-9708-019B960494DF}">
-                  <a14:hiddenLine xmlns:a14="http://schemas.microsoft.com/office/drawing/2010/main" xmlns="" w="9525">
+                  <a14:hiddenLine xmlns="" xmlns:a14="http://schemas.microsoft.com/office/drawing/2010/main" w="9525">
                     <a:solidFill>
                       <a:srgbClr val="000000"/>
                     </a:solidFill>
@@ -10214,7 +10214,7 @@
               </a:ln>
               <a:extLst>
                 <a:ext uri="{91240B29-F687-4f45-9708-019B960494DF}">
-                  <a14:hiddenLine xmlns:a14="http://schemas.microsoft.com/office/drawing/2010/main" xmlns="" w="9525">
+                  <a14:hiddenLine xmlns="" xmlns:a14="http://schemas.microsoft.com/office/drawing/2010/main" w="9525">
                     <a:solidFill>
                       <a:srgbClr val="000000"/>
                     </a:solidFill>
@@ -10279,7 +10279,7 @@
               </a:ln>
               <a:extLst>
                 <a:ext uri="{91240B29-F687-4f45-9708-019B960494DF}">
-                  <a14:hiddenLine xmlns:a14="http://schemas.microsoft.com/office/drawing/2010/main" xmlns="" w="9525">
+                  <a14:hiddenLine xmlns="" xmlns:a14="http://schemas.microsoft.com/office/drawing/2010/main" w="9525">
                     <a:solidFill>
                       <a:srgbClr val="000000"/>
                     </a:solidFill>
@@ -10369,7 +10369,7 @@
               </a:ln>
               <a:extLst>
                 <a:ext uri="{91240B29-F687-4f45-9708-019B960494DF}">
-                  <a14:hiddenLine xmlns:a14="http://schemas.microsoft.com/office/drawing/2010/main" xmlns="" w="9525">
+                  <a14:hiddenLine xmlns="" xmlns:a14="http://schemas.microsoft.com/office/drawing/2010/main" w="9525">
                     <a:solidFill>
                       <a:srgbClr val="000000"/>
                     </a:solidFill>
@@ -10431,7 +10431,7 @@
               </a:ln>
               <a:extLst>
                 <a:ext uri="{91240B29-F687-4f45-9708-019B960494DF}">
-                  <a14:hiddenLine xmlns:a14="http://schemas.microsoft.com/office/drawing/2010/main" xmlns="" w="9525">
+                  <a14:hiddenLine xmlns="" xmlns:a14="http://schemas.microsoft.com/office/drawing/2010/main" w="9525">
                     <a:solidFill>
                       <a:srgbClr val="000000"/>
                     </a:solidFill>
@@ -10521,7 +10521,7 @@
               </a:ln>
               <a:extLst>
                 <a:ext uri="{91240B29-F687-4f45-9708-019B960494DF}">
-                  <a14:hiddenLine xmlns:a14="http://schemas.microsoft.com/office/drawing/2010/main" xmlns="" w="9525">
+                  <a14:hiddenLine xmlns="" xmlns:a14="http://schemas.microsoft.com/office/drawing/2010/main" w="9525">
                     <a:solidFill>
                       <a:srgbClr val="000000"/>
                     </a:solidFill>
@@ -10586,7 +10586,7 @@
               </a:ln>
               <a:extLst>
                 <a:ext uri="{91240B29-F687-4f45-9708-019B960494DF}">
-                  <a14:hiddenLine xmlns:a14="http://schemas.microsoft.com/office/drawing/2010/main" xmlns="" w="9525">
+                  <a14:hiddenLine xmlns="" xmlns:a14="http://schemas.microsoft.com/office/drawing/2010/main" w="9525">
                     <a:solidFill>
                       <a:srgbClr val="000000"/>
                     </a:solidFill>
@@ -10648,7 +10648,7 @@
               </a:ln>
               <a:extLst>
                 <a:ext uri="{91240B29-F687-4f45-9708-019B960494DF}">
-                  <a14:hiddenLine xmlns:a14="http://schemas.microsoft.com/office/drawing/2010/main" xmlns="" w="9525">
+                  <a14:hiddenLine xmlns="" xmlns:a14="http://schemas.microsoft.com/office/drawing/2010/main" w="9525">
                     <a:solidFill>
                       <a:srgbClr val="000000"/>
                     </a:solidFill>
@@ -10738,7 +10738,7 @@
               </a:ln>
               <a:extLst>
                 <a:ext uri="{91240B29-F687-4f45-9708-019B960494DF}">
-                  <a14:hiddenLine xmlns:a14="http://schemas.microsoft.com/office/drawing/2010/main" xmlns="" w="9525">
+                  <a14:hiddenLine xmlns="" xmlns:a14="http://schemas.microsoft.com/office/drawing/2010/main" w="9525">
                     <a:solidFill>
                       <a:srgbClr val="000000"/>
                     </a:solidFill>
@@ -10828,7 +10828,7 @@
               </a:ln>
               <a:extLst>
                 <a:ext uri="{91240B29-F687-4f45-9708-019B960494DF}">
-                  <a14:hiddenLine xmlns:a14="http://schemas.microsoft.com/office/drawing/2010/main" xmlns="" w="9525">
+                  <a14:hiddenLine xmlns="" xmlns:a14="http://schemas.microsoft.com/office/drawing/2010/main" w="9525">
                     <a:solidFill>
                       <a:srgbClr val="000000"/>
                     </a:solidFill>
@@ -10893,7 +10893,7 @@
               </a:ln>
               <a:extLst>
                 <a:ext uri="{91240B29-F687-4f45-9708-019B960494DF}">
-                  <a14:hiddenLine xmlns:a14="http://schemas.microsoft.com/office/drawing/2010/main" xmlns="" w="9525">
+                  <a14:hiddenLine xmlns="" xmlns:a14="http://schemas.microsoft.com/office/drawing/2010/main" w="9525">
                     <a:solidFill>
                       <a:srgbClr val="000000"/>
                     </a:solidFill>
@@ -11013,7 +11013,7 @@
               </a:ln>
               <a:extLst>
                 <a:ext uri="{91240B29-F687-4f45-9708-019B960494DF}">
-                  <a14:hiddenLine xmlns:a14="http://schemas.microsoft.com/office/drawing/2010/main" xmlns="" w="9525">
+                  <a14:hiddenLine xmlns="" xmlns:a14="http://schemas.microsoft.com/office/drawing/2010/main" w="9525">
                     <a:solidFill>
                       <a:srgbClr val="000000"/>
                     </a:solidFill>
@@ -11094,7 +11094,7 @@
               </a:ln>
               <a:extLst>
                 <a:ext uri="{91240B29-F687-4f45-9708-019B960494DF}">
-                  <a14:hiddenLine xmlns:a14="http://schemas.microsoft.com/office/drawing/2010/main" xmlns="" w="9525">
+                  <a14:hiddenLine xmlns="" xmlns:a14="http://schemas.microsoft.com/office/drawing/2010/main" w="9525">
                     <a:solidFill>
                       <a:srgbClr val="000000"/>
                     </a:solidFill>
@@ -11209,7 +11209,7 @@
               </a:ln>
               <a:extLst>
                 <a:ext uri="{91240B29-F687-4f45-9708-019B960494DF}">
-                  <a14:hiddenLine xmlns:a14="http://schemas.microsoft.com/office/drawing/2010/main" xmlns="" w="9525">
+                  <a14:hiddenLine xmlns="" xmlns:a14="http://schemas.microsoft.com/office/drawing/2010/main" w="9525">
                     <a:solidFill>
                       <a:srgbClr val="000000"/>
                     </a:solidFill>
@@ -11299,7 +11299,7 @@
               </a:ln>
               <a:extLst>
                 <a:ext uri="{91240B29-F687-4f45-9708-019B960494DF}">
-                  <a14:hiddenLine xmlns:a14="http://schemas.microsoft.com/office/drawing/2010/main" xmlns="" w="9525">
+                  <a14:hiddenLine xmlns="" xmlns:a14="http://schemas.microsoft.com/office/drawing/2010/main" w="9525">
                     <a:solidFill>
                       <a:srgbClr val="000000"/>
                     </a:solidFill>
@@ -11364,7 +11364,7 @@
               </a:ln>
               <a:extLst>
                 <a:ext uri="{91240B29-F687-4f45-9708-019B960494DF}">
-                  <a14:hiddenLine xmlns:a14="http://schemas.microsoft.com/office/drawing/2010/main" xmlns="" w="9525">
+                  <a14:hiddenLine xmlns="" xmlns:a14="http://schemas.microsoft.com/office/drawing/2010/main" w="9525">
                     <a:solidFill>
                       <a:srgbClr val="000000"/>
                     </a:solidFill>
@@ -11454,7 +11454,7 @@
               </a:ln>
               <a:extLst>
                 <a:ext uri="{91240B29-F687-4f45-9708-019B960494DF}">
-                  <a14:hiddenLine xmlns:a14="http://schemas.microsoft.com/office/drawing/2010/main" xmlns="" w="9525">
+                  <a14:hiddenLine xmlns="" xmlns:a14="http://schemas.microsoft.com/office/drawing/2010/main" w="9525">
                     <a:solidFill>
                       <a:srgbClr val="000000"/>
                     </a:solidFill>
@@ -11522,7 +11522,7 @@
               </a:ln>
               <a:extLst>
                 <a:ext uri="{91240B29-F687-4f45-9708-019B960494DF}">
-                  <a14:hiddenLine xmlns:a14="http://schemas.microsoft.com/office/drawing/2010/main" xmlns="" w="9525">
+                  <a14:hiddenLine xmlns="" xmlns:a14="http://schemas.microsoft.com/office/drawing/2010/main" w="9525">
                     <a:solidFill>
                       <a:srgbClr val="000000"/>
                     </a:solidFill>
@@ -11612,7 +11612,7 @@
               </a:ln>
               <a:extLst>
                 <a:ext uri="{91240B29-F687-4f45-9708-019B960494DF}">
-                  <a14:hiddenLine xmlns:a14="http://schemas.microsoft.com/office/drawing/2010/main" xmlns="" w="9525">
+                  <a14:hiddenLine xmlns="" xmlns:a14="http://schemas.microsoft.com/office/drawing/2010/main" w="9525">
                     <a:solidFill>
                       <a:srgbClr val="000000"/>
                     </a:solidFill>
@@ -11680,7 +11680,7 @@
               </a:ln>
               <a:extLst>
                 <a:ext uri="{91240B29-F687-4f45-9708-019B960494DF}">
-                  <a14:hiddenLine xmlns:a14="http://schemas.microsoft.com/office/drawing/2010/main" xmlns="" w="9525">
+                  <a14:hiddenLine xmlns="" xmlns:a14="http://schemas.microsoft.com/office/drawing/2010/main" w="9525">
                     <a:solidFill>
                       <a:srgbClr val="000000"/>
                     </a:solidFill>
@@ -11770,7 +11770,7 @@
               </a:ln>
               <a:extLst>
                 <a:ext uri="{91240B29-F687-4f45-9708-019B960494DF}">
-                  <a14:hiddenLine xmlns:a14="http://schemas.microsoft.com/office/drawing/2010/main" xmlns="" w="9525">
+                  <a14:hiddenLine xmlns="" xmlns:a14="http://schemas.microsoft.com/office/drawing/2010/main" w="9525">
                     <a:solidFill>
                       <a:srgbClr val="000000"/>
                     </a:solidFill>
@@ -11804,7 +11804,7 @@
               </a:ln>
               <a:extLst>
                 <a:ext uri="{91240B29-F687-4f45-9708-019B960494DF}">
-                  <a14:hiddenLine xmlns:a14="http://schemas.microsoft.com/office/drawing/2010/main" xmlns="" w="9525">
+                  <a14:hiddenLine xmlns="" xmlns:a14="http://schemas.microsoft.com/office/drawing/2010/main" w="9525">
                     <a:solidFill>
                       <a:srgbClr val="000000"/>
                     </a:solidFill>
@@ -12444,7 +12444,7 @@
             <a:pPr algn="ctr"/>
             <a:r>
               <a:rPr lang="en-US" dirty="0"/>
-              <a:t>SE2 – SPG Sprint 2</a:t>
+              <a:t>SE2 – SPG Sprint 3</a:t>
             </a:r>
           </a:p>
         </p:txBody>
@@ -12981,14 +12981,19 @@
                 <a:effectLst/>
                 <a:latin typeface="-apple-system"/>
               </a:rPr>
-              <a:t>Hours spent on remediation: 1d 2h 30m</a:t>
-            </a:r>
-          </a:p>
-          <a:p>
-            <a:pPr algn="l">
-              <a:buFont typeface="Arial" panose="020B0604020202020204" pitchFamily="34" charset="0"/>
-              <a:buChar char="•"/>
-            </a:pPr>
+              <a:t>Hours spent on remediation: 1d </a:t>
+            </a:r>
+          </a:p>
+          <a:p>
+            <a:r>
+              <a:rPr lang="en-US" dirty="0">
+                <a:solidFill>
+                  <a:srgbClr val="C9D1D9"/>
+                </a:solidFill>
+                <a:latin typeface="-apple-system"/>
+              </a:rPr>
+              <a:t>D</a:t>
+            </a:r>
             <a:r>
               <a:rPr lang="en-US" b="0" i="0" dirty="0">
                 <a:solidFill>
@@ -12997,7 +13002,7 @@
                 <a:effectLst/>
                 <a:latin typeface="-apple-system"/>
               </a:rPr>
-              <a:t>debt ratio (as reported by SonarQube under "Measures-Maintainability"): 0.3%</a:t>
+              <a:t>ebt ratio (as reported by SonarQube under "Measures-Maintainability"): 0.3%</a:t>
             </a:r>
             <a:endParaRPr lang="en-US" b="1" i="0" dirty="0">
               <a:solidFill>
@@ -13013,6 +13018,15 @@
               <a:buChar char="•"/>
             </a:pPr>
             <a:r>
+              <a:rPr lang="en-US" dirty="0">
+                <a:solidFill>
+                  <a:srgbClr val="C9D1D9"/>
+                </a:solidFill>
+                <a:latin typeface="-apple-system"/>
+              </a:rPr>
+              <a:t>R</a:t>
+            </a:r>
+            <a:r>
               <a:rPr lang="en-US" b="0" i="0" dirty="0">
                 <a:solidFill>
                   <a:srgbClr val="C9D1D9"/>
@@ -13020,7 +13034,7 @@
                 <a:effectLst/>
                 <a:latin typeface="-apple-system"/>
               </a:rPr>
-              <a:t>rating for each quality characteristic reported in SonarQube under "Measures" (namely reliability, security, maintainability): </a:t>
+              <a:t>ating for each quality characteristic reported in SonarQube under "Measures" (namely reliability, security, maintainability): </a:t>
             </a:r>
           </a:p>
           <a:p>
@@ -13364,11 +13378,13 @@
             <a:r>
               <a:rPr lang="en-US" sz="2000" dirty="0">
                 <a:solidFill>
-                  <a:srgbClr val="FF0000"/>
+                  <a:schemeClr val="tx1">
+                    <a:lumMod val="85000"/>
+                  </a:schemeClr>
                 </a:solidFill>
                 <a:latin typeface="-apple-system"/>
               </a:rPr>
-              <a:t>Comment more our code to let the other group mates understand what we did.</a:t>
+              <a:t>Story integration was not as swift as we expected. We faced some initial difficulty on integrating our previously implemented stories with the new ones</a:t>
             </a:r>
           </a:p>
           <a:p>
@@ -13378,11 +13394,13 @@
             <a:r>
               <a:rPr lang="en-US" sz="2000" dirty="0">
                 <a:solidFill>
-                  <a:srgbClr val="FF0000"/>
+                  <a:schemeClr val="tx1">
+                    <a:lumMod val="85000"/>
+                  </a:schemeClr>
                 </a:solidFill>
                 <a:latin typeface="-apple-system"/>
               </a:rPr>
-              <a:t>Write a general documentation in the readme file (for example write the users credentials).</a:t>
+              <a:t>Documentation (the Git readme) proved to be very helpful and we often used it as a “manual” to quickly search and get the information we needed</a:t>
             </a:r>
           </a:p>
           <a:p>
@@ -13392,11 +13410,13 @@
             <a:r>
               <a:rPr lang="en-US" sz="2000" dirty="0">
                 <a:solidFill>
-                  <a:srgbClr val="FF0000"/>
+                  <a:schemeClr val="tx1">
+                    <a:lumMod val="85000"/>
+                  </a:schemeClr>
                 </a:solidFill>
                 <a:latin typeface="-apple-system"/>
               </a:rPr>
-              <a:t>A good FE needs more development time allocated.</a:t>
+              <a:t>At the end of this sprint we were able to deliver a much better looking and much more responsive app. This step helped us better understand the effects of a better design on the stakeholders feedback and “happiness”</a:t>
             </a:r>
           </a:p>
         </p:txBody>
@@ -13688,7 +13708,7 @@
                 </a:solidFill>
                 <a:latin typeface="-apple-system"/>
               </a:rPr>
-              <a:t>We achieved all of the goals set in the previous retrospective.</a:t>
+              <a:t>We achieved all of the goals set in the previous retrospective</a:t>
             </a:r>
             <a:endParaRPr lang="en-US" sz="2000" b="0" i="0" dirty="0">
               <a:solidFill>
@@ -13822,11 +13842,13 @@
             <a:r>
               <a:rPr lang="en-US" sz="2000" dirty="0">
                 <a:solidFill>
-                  <a:srgbClr val="FF0000"/>
+                  <a:schemeClr val="tx1">
+                    <a:lumMod val="85000"/>
+                  </a:schemeClr>
                 </a:solidFill>
                 <a:latin typeface="-apple-system"/>
               </a:rPr>
-              <a:t>We need to increase the technical debt remediation time and to increase the number of technical tasks needed to refactor our code and make the UI responsive.</a:t>
+              <a:t>We need to further improve the design and the usability of our application</a:t>
             </a:r>
           </a:p>
           <a:p>
@@ -13834,9 +13856,27 @@
               <a:buAutoNum type="arabicPeriod"/>
             </a:pPr>
             <a:r>
+              <a:rPr lang="en-US" sz="2000" dirty="0">
+                <a:solidFill>
+                  <a:schemeClr val="tx1">
+                    <a:lumMod val="85000"/>
+                  </a:schemeClr>
+                </a:solidFill>
+                <a:latin typeface="-apple-system"/>
+              </a:rPr>
+              <a:t>We need to better show the state of our system by showing more meaningful alerts and messages to the user</a:t>
+            </a:r>
+          </a:p>
+          <a:p>
+            <a:pPr marL="457200" indent="-457200" algn="l">
+              <a:buAutoNum type="arabicPeriod"/>
+            </a:pPr>
+            <a:r>
               <a:rPr lang="en-US" sz="2000" b="0" i="0" dirty="0">
                 <a:solidFill>
-                  <a:srgbClr val="FF0000"/>
+                  <a:schemeClr val="tx1">
+                    <a:lumMod val="85000"/>
+                  </a:schemeClr>
                 </a:solidFill>
                 <a:effectLst/>
                 <a:latin typeface="-apple-system"/>
@@ -13846,15 +13886,19 @@
             <a:r>
               <a:rPr lang="en-US" sz="2000" dirty="0">
                 <a:solidFill>
-                  <a:srgbClr val="FF0000"/>
+                  <a:schemeClr val="tx1">
+                    <a:lumMod val="85000"/>
+                  </a:schemeClr>
                 </a:solidFill>
                 <a:latin typeface="-apple-system"/>
               </a:rPr>
-              <a:t>e plan to develop less stories and focus more on the currently open issues and app visual improvements.</a:t>
+              <a:t>e plan to increase the amount and granularity of our test suites to achieve a higher coverage and to discover bugs quicker</a:t>
             </a:r>
             <a:endParaRPr lang="en-US" b="0" i="0" dirty="0">
               <a:solidFill>
-                <a:srgbClr val="FF0000"/>
+                <a:schemeClr val="tx1">
+                  <a:lumMod val="85000"/>
+                </a:schemeClr>
               </a:solidFill>
               <a:effectLst/>
               <a:latin typeface="-apple-system"/>
@@ -13989,7 +14033,7 @@
                 <a:effectLst/>
                 <a:latin typeface="-apple-system"/>
               </a:rPr>
-              <a:t>We supported each other on any difficulty that appeared.</a:t>
+              <a:t>Teamwork, as it was also the case in the previous two sprints, was awesome. We helped each other in solving problems and reviewing code from previously implemented stories</a:t>
             </a:r>
           </a:p>
           <a:p>

</xml_diff>